<commit_message>
typos and some minor additions
</commit_message>
<xml_diff>
--- a/assets/Rise App .pptx
+++ b/assets/Rise App .pptx
@@ -587,7 +587,7 @@
           <a:p>
             <a:fld id="{EA0C0817-A112-4847-8014-A94B7D2A4EA3}" type="datetime1">
               <a:rPr lang="en-US" smtClean="0"/>
-              <a:t>1/4/21</a:t>
+              <a:t>1/5/2021</a:t>
             </a:fld>
             <a:endParaRPr lang="en-US" dirty="0"/>
           </a:p>
@@ -789,7 +789,7 @@
           <a:p>
             <a:fld id="{134F40B7-36AB-4376-BE14-EF7004D79BB9}" type="datetime1">
               <a:rPr lang="en-US" smtClean="0"/>
-              <a:t>1/4/21</a:t>
+              <a:t>1/5/2021</a:t>
             </a:fld>
             <a:endParaRPr lang="en-US" dirty="0"/>
           </a:p>
@@ -969,7 +969,7 @@
           <a:p>
             <a:fld id="{FF87CAB8-DCAE-46A5-AADA-B3FAD11A54E0}" type="datetime1">
               <a:rPr lang="en-US" smtClean="0"/>
-              <a:t>1/4/21</a:t>
+              <a:t>1/5/2021</a:t>
             </a:fld>
             <a:endParaRPr lang="en-US" dirty="0"/>
           </a:p>
@@ -1139,7 +1139,7 @@
           <a:p>
             <a:fld id="{7332B432-ACDA-4023-A761-2BAB76577B62}" type="datetime1">
               <a:rPr lang="en-US" smtClean="0"/>
-              <a:t>1/4/21</a:t>
+              <a:t>1/5/2021</a:t>
             </a:fld>
             <a:endParaRPr lang="en-US" dirty="0"/>
           </a:p>
@@ -1738,7 +1738,7 @@
           <a:p>
             <a:fld id="{D9C646AA-F36E-4540-911D-FFFC0A0EF24A}" type="datetime1">
               <a:rPr lang="en-US" smtClean="0"/>
-              <a:t>1/4/21</a:t>
+              <a:t>1/5/2021</a:t>
             </a:fld>
             <a:endParaRPr lang="en-US" dirty="0"/>
           </a:p>
@@ -2058,7 +2058,7 @@
           <a:p>
             <a:fld id="{69186D26-FA5F-4637-B602-B7C2DC34CFD4}" type="datetime1">
               <a:rPr lang="en-US" smtClean="0"/>
-              <a:t>1/4/21</a:t>
+              <a:t>1/5/2021</a:t>
             </a:fld>
             <a:endParaRPr lang="en-US" dirty="0"/>
           </a:p>
@@ -2495,7 +2495,7 @@
           <a:p>
             <a:fld id="{8A7F15D8-96D1-4781-BC50-CA8A088B2FE4}" type="datetime1">
               <a:rPr lang="en-US" smtClean="0"/>
-              <a:t>1/4/21</a:t>
+              <a:t>1/5/2021</a:t>
             </a:fld>
             <a:endParaRPr lang="en-US" dirty="0"/>
           </a:p>
@@ -2613,7 +2613,7 @@
           <a:p>
             <a:fld id="{F9A96C99-B8F8-4528-BD05-0E16E943DC09}" type="datetime1">
               <a:rPr lang="en-US" smtClean="0"/>
-              <a:t>1/4/21</a:t>
+              <a:t>1/5/2021</a:t>
             </a:fld>
             <a:endParaRPr lang="en-US" dirty="0"/>
           </a:p>
@@ -2708,7 +2708,7 @@
           <a:p>
             <a:fld id="{03636942-C211-4B28-8DBD-C953E00AF71B}" type="datetime1">
               <a:rPr lang="en-US" smtClean="0"/>
-              <a:t>1/4/21</a:t>
+              <a:t>1/5/2021</a:t>
             </a:fld>
             <a:endParaRPr lang="en-US" dirty="0"/>
           </a:p>
@@ -3125,7 +3125,7 @@
           <a:p>
             <a:fld id="{7E8D12A6-918A-48BD-8CB9-CA713993B0EA}" type="datetime1">
               <a:rPr lang="en-US" smtClean="0"/>
-              <a:t>1/4/21</a:t>
+              <a:t>1/5/2021</a:t>
             </a:fld>
             <a:endParaRPr lang="en-US" dirty="0"/>
           </a:p>
@@ -3387,7 +3387,7 @@
             <a:fld id="{E778CE86-875F-4587-BCF6-FA054AFC0D53}" type="datetime1">
               <a:rPr lang="en-US" smtClean="0"/>
               <a:pPr/>
-              <a:t>1/4/21</a:t>
+              <a:t>1/5/2021</a:t>
             </a:fld>
             <a:endParaRPr lang="en-US" dirty="0"/>
           </a:p>
@@ -3903,7 +3903,7 @@
           <a:p>
             <a:fld id="{F6FA2B21-3FCD-4721-B95C-427943F61125}" type="datetime1">
               <a:rPr lang="en-US" smtClean="0"/>
-              <a:t>1/4/21</a:t>
+              <a:t>1/5/2021</a:t>
             </a:fld>
             <a:endParaRPr lang="en-US" dirty="0"/>
           </a:p>
@@ -5902,7 +5902,7 @@
           <a:p>
             <a:r>
               <a:rPr lang="en-US" dirty="0"/>
-              <a:t>Yoga (HTML, CSS, JS)</a:t>
+              <a:t>Yoga Page (HTML, CSS, JS)</a:t>
             </a:r>
           </a:p>
           <a:p>
@@ -6771,9 +6771,6 @@
             </a:r>
           </a:p>
           <a:p>
-            <a:endParaRPr lang="en-US" sz="1600" dirty="0"/>
-          </a:p>
-          <a:p>
             <a:r>
               <a:rPr lang="en-US" sz="1600" dirty="0"/>
               <a:t>Make it more mobile optimized or even mobile first.</a:t>
@@ -6782,20 +6779,20 @@
           <a:p>
             <a:r>
               <a:rPr lang="en-US" sz="1600" dirty="0"/>
-              <a:t>User more animations in CSS</a:t>
-            </a:r>
-          </a:p>
-          <a:p>
-            <a:endParaRPr lang="en-US" sz="1600" dirty="0"/>
+              <a:t>Use more animations in CSS. </a:t>
+            </a:r>
+          </a:p>
+          <a:p>
+            <a:r>
+              <a:rPr lang="en-US" sz="1600" dirty="0"/>
+              <a:t>Connect other playlists through Soundcloud and allow users to create and save their own playlists</a:t>
+            </a:r>
           </a:p>
           <a:p>
             <a:r>
               <a:rPr lang="en-US" sz="1600" dirty="0"/>
               <a:t>Implement a Search API of some kind(with certain parameters) so that users can find what they want if it’s not on the app</a:t>
             </a:r>
-          </a:p>
-          <a:p>
-            <a:endParaRPr lang="en-US" sz="1600" dirty="0"/>
           </a:p>
           <a:p>
             <a:r>
@@ -7386,6 +7383,24 @@
 </file>
 
 <file path=customXml/item1.xml><?xml version="1.0" encoding="utf-8"?>
+<?mso-contentType ?>
+<FormTemplates xmlns="http://schemas.microsoft.com/sharepoint/v3/contenttype/forms">
+  <Display>DocumentLibraryForm</Display>
+  <Edit>DocumentLibraryForm</Edit>
+  <New>DocumentLibraryForm</New>
+</FormTemplates>
+</file>
+
+<file path=customXml/item2.xml><?xml version="1.0" encoding="utf-8"?>
+<p:properties xmlns:p="http://schemas.microsoft.com/office/2006/metadata/properties" xmlns:xsi="http://www.w3.org/2001/XMLSchema-instance" xmlns:pc="http://schemas.microsoft.com/office/infopath/2007/PartnerControls">
+  <documentManagement>
+    <Status xmlns="71af3243-3dd4-4a8d-8c0d-dd76da1f02a5">Not started</Status>
+    <MediaServiceKeyPoints xmlns="71af3243-3dd4-4a8d-8c0d-dd76da1f02a5" xsi:nil="true"/>
+  </documentManagement>
+</p:properties>
+</file>
+
+<file path=customXml/item3.xml><?xml version="1.0" encoding="utf-8"?>
 <ct:contentTypeSchema xmlns:ct="http://schemas.microsoft.com/office/2006/metadata/contentType" xmlns:ma="http://schemas.microsoft.com/office/2006/metadata/properties/metaAttributes" ct:_="" ma:_="" ma:contentTypeName="Document" ma:contentTypeID="0x01010079F111ED35F8CC479449609E8A0923A6" ma:contentTypeVersion="12" ma:contentTypeDescription="Create a new document." ma:contentTypeScope="" ma:versionID="a410dd7f93c95333ffa1b60ed6adedd1">
   <xsd:schema xmlns:xsd="http://www.w3.org/2001/XMLSchema" xmlns:xs="http://www.w3.org/2001/XMLSchema" xmlns:p="http://schemas.microsoft.com/office/2006/metadata/properties" xmlns:ns2="71af3243-3dd4-4a8d-8c0d-dd76da1f02a5" xmlns:ns3="16c05727-aa75-4e4a-9b5f-8a80a1165891" targetNamespace="http://schemas.microsoft.com/office/2006/metadata/properties" ma:root="true" ma:fieldsID="a936d9baba76aa3866493feff160faab" ns2:_="" ns3:_="">
     <xsd:import namespace="71af3243-3dd4-4a8d-8c0d-dd76da1f02a5"/>
@@ -7606,25 +7621,25 @@
 </ct:contentTypeSchema>
 </file>
 
-<file path=customXml/item2.xml><?xml version="1.0" encoding="utf-8"?>
-<p:properties xmlns:p="http://schemas.microsoft.com/office/2006/metadata/properties" xmlns:xsi="http://www.w3.org/2001/XMLSchema-instance" xmlns:pc="http://schemas.microsoft.com/office/infopath/2007/PartnerControls">
-  <documentManagement>
-    <Status xmlns="71af3243-3dd4-4a8d-8c0d-dd76da1f02a5">Not started</Status>
-    <MediaServiceKeyPoints xmlns="71af3243-3dd4-4a8d-8c0d-dd76da1f02a5" xsi:nil="true"/>
-  </documentManagement>
-</p:properties>
+<file path=customXml/itemProps1.xml><?xml version="1.0" encoding="utf-8"?>
+<ds:datastoreItem xmlns:ds="http://schemas.openxmlformats.org/officeDocument/2006/customXml" ds:itemID="{294F055B-D391-44D3-A87A-BCD07BD5A31C}">
+  <ds:schemaRefs>
+    <ds:schemaRef ds:uri="http://schemas.microsoft.com/sharepoint/v3/contenttype/forms"/>
+  </ds:schemaRefs>
+</ds:datastoreItem>
 </file>
 
-<file path=customXml/item3.xml><?xml version="1.0" encoding="utf-8"?>
-<?mso-contentType ?>
-<FormTemplates xmlns="http://schemas.microsoft.com/sharepoint/v3/contenttype/forms">
-  <Display>DocumentLibraryForm</Display>
-  <Edit>DocumentLibraryForm</Edit>
-  <New>DocumentLibraryForm</New>
-</FormTemplates>
+<file path=customXml/itemProps2.xml><?xml version="1.0" encoding="utf-8"?>
+<ds:datastoreItem xmlns:ds="http://schemas.openxmlformats.org/officeDocument/2006/customXml" ds:itemID="{B975FBC4-9D33-46BE-911D-419763BA9AF9}">
+  <ds:schemaRefs>
+    <ds:schemaRef ds:uri="http://schemas.microsoft.com/office/2006/metadata/properties"/>
+    <ds:schemaRef ds:uri="http://schemas.microsoft.com/office/infopath/2007/PartnerControls"/>
+    <ds:schemaRef ds:uri="71af3243-3dd4-4a8d-8c0d-dd76da1f02a5"/>
+  </ds:schemaRefs>
+</ds:datastoreItem>
 </file>
 
-<file path=customXml/itemProps1.xml><?xml version="1.0" encoding="utf-8"?>
+<file path=customXml/itemProps3.xml><?xml version="1.0" encoding="utf-8"?>
 <ds:datastoreItem xmlns:ds="http://schemas.openxmlformats.org/officeDocument/2006/customXml" ds:itemID="{26DBD101-FC0A-4B21-82B0-57CAA7AEEC71}">
   <ds:schemaRefs>
     <ds:schemaRef ds:uri="http://schemas.microsoft.com/office/2006/metadata/contentType"/>
@@ -7641,22 +7656,4 @@
     <ds:schemaRef ds:uri="http://schemas.microsoft.com/internal/obd"/>
   </ds:schemaRefs>
 </ds:datastoreItem>
-</file>
-
-<file path=customXml/itemProps2.xml><?xml version="1.0" encoding="utf-8"?>
-<ds:datastoreItem xmlns:ds="http://schemas.openxmlformats.org/officeDocument/2006/customXml" ds:itemID="{B975FBC4-9D33-46BE-911D-419763BA9AF9}">
-  <ds:schemaRefs>
-    <ds:schemaRef ds:uri="http://schemas.microsoft.com/office/2006/metadata/properties"/>
-    <ds:schemaRef ds:uri="http://schemas.microsoft.com/office/infopath/2007/PartnerControls"/>
-    <ds:schemaRef ds:uri="71af3243-3dd4-4a8d-8c0d-dd76da1f02a5"/>
-  </ds:schemaRefs>
-</ds:datastoreItem>
-</file>
-
-<file path=customXml/itemProps3.xml><?xml version="1.0" encoding="utf-8"?>
-<ds:datastoreItem xmlns:ds="http://schemas.openxmlformats.org/officeDocument/2006/customXml" ds:itemID="{294F055B-D391-44D3-A87A-BCD07BD5A31C}">
-  <ds:schemaRefs>
-    <ds:schemaRef ds:uri="http://schemas.microsoft.com/sharepoint/v3/contenttype/forms"/>
-  </ds:schemaRefs>
-</ds:datastoreItem>
 </file>
</xml_diff>